<commit_message>
-cleaned up RF code (more logical ordering + summary section)
</commit_message>
<xml_diff>
--- a/poster/tables/machine-learning.pptx
+++ b/poster/tables/machine-learning.pptx
@@ -341,7 +341,7 @@
     </p:spTree>
     <p:extLst>
       <p:ext uri="{BB962C8B-B14F-4D97-AF65-F5344CB8AC3E}">
-        <p14:creationId xmlns:p14="http://schemas.microsoft.com/office/powerpoint/2010/main" xmlns="" val="1676390356"/>
+        <p14:creationId xmlns:p14="http://schemas.microsoft.com/office/powerpoint/2010/main" val="1676390356"/>
       </p:ext>
     </p:extLst>
   </p:cSld>
@@ -513,7 +513,7 @@
     </p:spTree>
     <p:extLst>
       <p:ext uri="{BB962C8B-B14F-4D97-AF65-F5344CB8AC3E}">
-        <p14:creationId xmlns:p14="http://schemas.microsoft.com/office/powerpoint/2010/main" xmlns="" val="4160532229"/>
+        <p14:creationId xmlns:p14="http://schemas.microsoft.com/office/powerpoint/2010/main" val="4160532229"/>
       </p:ext>
     </p:extLst>
   </p:cSld>
@@ -695,7 +695,7 @@
     </p:spTree>
     <p:extLst>
       <p:ext uri="{BB962C8B-B14F-4D97-AF65-F5344CB8AC3E}">
-        <p14:creationId xmlns:p14="http://schemas.microsoft.com/office/powerpoint/2010/main" xmlns="" val="2295244733"/>
+        <p14:creationId xmlns:p14="http://schemas.microsoft.com/office/powerpoint/2010/main" val="2295244733"/>
       </p:ext>
     </p:extLst>
   </p:cSld>
@@ -867,7 +867,7 @@
     </p:spTree>
     <p:extLst>
       <p:ext uri="{BB962C8B-B14F-4D97-AF65-F5344CB8AC3E}">
-        <p14:creationId xmlns:p14="http://schemas.microsoft.com/office/powerpoint/2010/main" xmlns="" val="1576496506"/>
+        <p14:creationId xmlns:p14="http://schemas.microsoft.com/office/powerpoint/2010/main" val="1576496506"/>
       </p:ext>
     </p:extLst>
   </p:cSld>
@@ -1115,7 +1115,7 @@
     </p:spTree>
     <p:extLst>
       <p:ext uri="{BB962C8B-B14F-4D97-AF65-F5344CB8AC3E}">
-        <p14:creationId xmlns:p14="http://schemas.microsoft.com/office/powerpoint/2010/main" xmlns="" val="1722802547"/>
+        <p14:creationId xmlns:p14="http://schemas.microsoft.com/office/powerpoint/2010/main" val="1722802547"/>
       </p:ext>
     </p:extLst>
   </p:cSld>
@@ -1405,7 +1405,7 @@
     </p:spTree>
     <p:extLst>
       <p:ext uri="{BB962C8B-B14F-4D97-AF65-F5344CB8AC3E}">
-        <p14:creationId xmlns:p14="http://schemas.microsoft.com/office/powerpoint/2010/main" xmlns="" val="4140625153"/>
+        <p14:creationId xmlns:p14="http://schemas.microsoft.com/office/powerpoint/2010/main" val="4140625153"/>
       </p:ext>
     </p:extLst>
   </p:cSld>
@@ -1829,7 +1829,7 @@
     </p:spTree>
     <p:extLst>
       <p:ext uri="{BB962C8B-B14F-4D97-AF65-F5344CB8AC3E}">
-        <p14:creationId xmlns:p14="http://schemas.microsoft.com/office/powerpoint/2010/main" xmlns="" val="292763480"/>
+        <p14:creationId xmlns:p14="http://schemas.microsoft.com/office/powerpoint/2010/main" val="292763480"/>
       </p:ext>
     </p:extLst>
   </p:cSld>
@@ -1949,7 +1949,7 @@
     </p:spTree>
     <p:extLst>
       <p:ext uri="{BB962C8B-B14F-4D97-AF65-F5344CB8AC3E}">
-        <p14:creationId xmlns:p14="http://schemas.microsoft.com/office/powerpoint/2010/main" xmlns="" val="2596691403"/>
+        <p14:creationId xmlns:p14="http://schemas.microsoft.com/office/powerpoint/2010/main" val="2596691403"/>
       </p:ext>
     </p:extLst>
   </p:cSld>
@@ -2046,7 +2046,7 @@
     </p:spTree>
     <p:extLst>
       <p:ext uri="{BB962C8B-B14F-4D97-AF65-F5344CB8AC3E}">
-        <p14:creationId xmlns:p14="http://schemas.microsoft.com/office/powerpoint/2010/main" xmlns="" val="440010998"/>
+        <p14:creationId xmlns:p14="http://schemas.microsoft.com/office/powerpoint/2010/main" val="440010998"/>
       </p:ext>
     </p:extLst>
   </p:cSld>
@@ -2325,7 +2325,7 @@
     </p:spTree>
     <p:extLst>
       <p:ext uri="{BB962C8B-B14F-4D97-AF65-F5344CB8AC3E}">
-        <p14:creationId xmlns:p14="http://schemas.microsoft.com/office/powerpoint/2010/main" xmlns="" val="668497909"/>
+        <p14:creationId xmlns:p14="http://schemas.microsoft.com/office/powerpoint/2010/main" val="668497909"/>
       </p:ext>
     </p:extLst>
   </p:cSld>
@@ -2580,7 +2580,7 @@
     </p:spTree>
     <p:extLst>
       <p:ext uri="{BB962C8B-B14F-4D97-AF65-F5344CB8AC3E}">
-        <p14:creationId xmlns:p14="http://schemas.microsoft.com/office/powerpoint/2010/main" xmlns="" val="3831942720"/>
+        <p14:creationId xmlns:p14="http://schemas.microsoft.com/office/powerpoint/2010/main" val="3831942720"/>
       </p:ext>
     </p:extLst>
   </p:cSld>
@@ -2831,7 +2831,7 @@
     </p:spTree>
     <p:extLst>
       <p:ext uri="{BB962C8B-B14F-4D97-AF65-F5344CB8AC3E}">
-        <p14:creationId xmlns:p14="http://schemas.microsoft.com/office/powerpoint/2010/main" xmlns="" val="2771107082"/>
+        <p14:creationId xmlns:p14="http://schemas.microsoft.com/office/powerpoint/2010/main" val="2771107082"/>
       </p:ext>
     </p:extLst>
   </p:cSld>
@@ -3128,7 +3128,7 @@
           <p:nvPr>
             <p:extLst>
               <p:ext uri="{D42A27DB-BD31-4B8C-83A1-F6EECF244321}">
-                <p14:modId xmlns:p14="http://schemas.microsoft.com/office/powerpoint/2010/main" xmlns="" val="1697204142"/>
+                <p14:modId xmlns:p14="http://schemas.microsoft.com/office/powerpoint/2010/main" val="672216660"/>
               </p:ext>
             </p:extLst>
           </p:nvPr>
@@ -4029,6 +4029,21 @@
                       <a:pPr algn="ctr"/>
                       <a:r>
                         <a:rPr lang="en-CA" sz="1100" dirty="0" smtClean="0"/>
+                        <a:t>0.85</a:t>
+                      </a:r>
+                      <a:endParaRPr lang="en-CA" sz="1100" dirty="0"/>
+                    </a:p>
+                  </a:txBody>
+                  <a:tcPr/>
+                </a:tc>
+                <a:tc>
+                  <a:txBody>
+                    <a:bodyPr/>
+                    <a:lstStyle/>
+                    <a:p>
+                      <a:pPr algn="ctr"/>
+                      <a:r>
+                        <a:rPr lang="en-CA" sz="1100" dirty="0" smtClean="0"/>
                         <a:t>0.99</a:t>
                       </a:r>
                       <a:endParaRPr lang="en-CA" sz="1100" dirty="0"/>
@@ -4058,23 +4073,8 @@
                     <a:p>
                       <a:pPr algn="ctr"/>
                       <a:r>
-                        <a:rPr lang="en-CA" sz="1100" dirty="0" smtClean="0"/>
+                        <a:rPr lang="en-CA" sz="1100" smtClean="0"/>
                         <a:t>0.99</a:t>
-                      </a:r>
-                      <a:endParaRPr lang="en-CA" sz="1100" dirty="0"/>
-                    </a:p>
-                  </a:txBody>
-                  <a:tcPr/>
-                </a:tc>
-                <a:tc>
-                  <a:txBody>
-                    <a:bodyPr/>
-                    <a:lstStyle/>
-                    <a:p>
-                      <a:pPr algn="ctr"/>
-                      <a:r>
-                        <a:rPr lang="en-CA" sz="1100" dirty="0" smtClean="0"/>
-                        <a:t>0.85</a:t>
                       </a:r>
                       <a:endParaRPr lang="en-CA" sz="1100" dirty="0"/>
                     </a:p>
@@ -4563,7 +4563,7 @@
           <p:nvPr>
             <p:extLst>
               <p:ext uri="{D42A27DB-BD31-4B8C-83A1-F6EECF244321}">
-                <p14:modId xmlns:p14="http://schemas.microsoft.com/office/powerpoint/2010/main" xmlns="" val="720987779"/>
+                <p14:modId xmlns:p14="http://schemas.microsoft.com/office/powerpoint/2010/main" val="720987779"/>
               </p:ext>
             </p:extLst>
           </p:nvPr>
@@ -5432,13 +5432,20 @@
     </p:spTree>
     <p:extLst>
       <p:ext uri="{BB962C8B-B14F-4D97-AF65-F5344CB8AC3E}">
-        <p14:creationId xmlns:p14="http://schemas.microsoft.com/office/powerpoint/2010/main" xmlns="" val="318504504"/>
+        <p14:creationId xmlns:p14="http://schemas.microsoft.com/office/powerpoint/2010/main" val="318504504"/>
       </p:ext>
     </p:extLst>
   </p:cSld>
   <p:clrMapOvr>
     <a:masterClrMapping/>
   </p:clrMapOvr>
+  <p:timing>
+    <p:tnLst>
+      <p:par>
+        <p:cTn id="1" dur="indefinite" restart="never" nodeType="tmRoot"/>
+      </p:par>
+    </p:tnLst>
+  </p:timing>
 </p:sld>
 </file>
 

</xml_diff>

<commit_message>
-added ROC curves to RF report
</commit_message>
<xml_diff>
--- a/poster/tables/machine-learning.pptx
+++ b/poster/tables/machine-learning.pptx
@@ -289,7 +289,7 @@
             <a:fld id="{15712E41-C572-4EE5-BEC3-AFDE027E7638}" type="datetimeFigureOut">
               <a:rPr lang="en-CA" smtClean="0"/>
               <a:pPr/>
-              <a:t>10/04/2014</a:t>
+              <a:t>11/04/2014</a:t>
             </a:fld>
             <a:endParaRPr lang="en-CA"/>
           </a:p>
@@ -461,7 +461,7 @@
             <a:fld id="{15712E41-C572-4EE5-BEC3-AFDE027E7638}" type="datetimeFigureOut">
               <a:rPr lang="en-CA" smtClean="0"/>
               <a:pPr/>
-              <a:t>10/04/2014</a:t>
+              <a:t>11/04/2014</a:t>
             </a:fld>
             <a:endParaRPr lang="en-CA"/>
           </a:p>
@@ -643,7 +643,7 @@
             <a:fld id="{15712E41-C572-4EE5-BEC3-AFDE027E7638}" type="datetimeFigureOut">
               <a:rPr lang="en-CA" smtClean="0"/>
               <a:pPr/>
-              <a:t>10/04/2014</a:t>
+              <a:t>11/04/2014</a:t>
             </a:fld>
             <a:endParaRPr lang="en-CA"/>
           </a:p>
@@ -815,7 +815,7 @@
             <a:fld id="{15712E41-C572-4EE5-BEC3-AFDE027E7638}" type="datetimeFigureOut">
               <a:rPr lang="en-CA" smtClean="0"/>
               <a:pPr/>
-              <a:t>10/04/2014</a:t>
+              <a:t>11/04/2014</a:t>
             </a:fld>
             <a:endParaRPr lang="en-CA"/>
           </a:p>
@@ -1063,7 +1063,7 @@
             <a:fld id="{15712E41-C572-4EE5-BEC3-AFDE027E7638}" type="datetimeFigureOut">
               <a:rPr lang="en-CA" smtClean="0"/>
               <a:pPr/>
-              <a:t>10/04/2014</a:t>
+              <a:t>11/04/2014</a:t>
             </a:fld>
             <a:endParaRPr lang="en-CA"/>
           </a:p>
@@ -1353,7 +1353,7 @@
             <a:fld id="{15712E41-C572-4EE5-BEC3-AFDE027E7638}" type="datetimeFigureOut">
               <a:rPr lang="en-CA" smtClean="0"/>
               <a:pPr/>
-              <a:t>10/04/2014</a:t>
+              <a:t>11/04/2014</a:t>
             </a:fld>
             <a:endParaRPr lang="en-CA"/>
           </a:p>
@@ -1777,7 +1777,7 @@
             <a:fld id="{15712E41-C572-4EE5-BEC3-AFDE027E7638}" type="datetimeFigureOut">
               <a:rPr lang="en-CA" smtClean="0"/>
               <a:pPr/>
-              <a:t>10/04/2014</a:t>
+              <a:t>11/04/2014</a:t>
             </a:fld>
             <a:endParaRPr lang="en-CA"/>
           </a:p>
@@ -1897,7 +1897,7 @@
             <a:fld id="{15712E41-C572-4EE5-BEC3-AFDE027E7638}" type="datetimeFigureOut">
               <a:rPr lang="en-CA" smtClean="0"/>
               <a:pPr/>
-              <a:t>10/04/2014</a:t>
+              <a:t>11/04/2014</a:t>
             </a:fld>
             <a:endParaRPr lang="en-CA"/>
           </a:p>
@@ -1994,7 +1994,7 @@
             <a:fld id="{15712E41-C572-4EE5-BEC3-AFDE027E7638}" type="datetimeFigureOut">
               <a:rPr lang="en-CA" smtClean="0"/>
               <a:pPr/>
-              <a:t>10/04/2014</a:t>
+              <a:t>11/04/2014</a:t>
             </a:fld>
             <a:endParaRPr lang="en-CA"/>
           </a:p>
@@ -2273,7 +2273,7 @@
             <a:fld id="{15712E41-C572-4EE5-BEC3-AFDE027E7638}" type="datetimeFigureOut">
               <a:rPr lang="en-CA" smtClean="0"/>
               <a:pPr/>
-              <a:t>10/04/2014</a:t>
+              <a:t>11/04/2014</a:t>
             </a:fld>
             <a:endParaRPr lang="en-CA"/>
           </a:p>
@@ -2528,7 +2528,7 @@
             <a:fld id="{15712E41-C572-4EE5-BEC3-AFDE027E7638}" type="datetimeFigureOut">
               <a:rPr lang="en-CA" smtClean="0"/>
               <a:pPr/>
-              <a:t>10/04/2014</a:t>
+              <a:t>11/04/2014</a:t>
             </a:fld>
             <a:endParaRPr lang="en-CA"/>
           </a:p>
@@ -2743,7 +2743,7 @@
             <a:fld id="{15712E41-C572-4EE5-BEC3-AFDE027E7638}" type="datetimeFigureOut">
               <a:rPr lang="en-CA" smtClean="0"/>
               <a:pPr/>
-              <a:t>10/04/2014</a:t>
+              <a:t>11/04/2014</a:t>
             </a:fld>
             <a:endParaRPr lang="en-CA"/>
           </a:p>
@@ -3128,7 +3128,7 @@
           <p:nvPr>
             <p:extLst>
               <p:ext uri="{D42A27DB-BD31-4B8C-83A1-F6EECF244321}">
-                <p14:modId xmlns:p14="http://schemas.microsoft.com/office/powerpoint/2010/main" val="672216660"/>
+                <p14:modId xmlns:p14="http://schemas.microsoft.com/office/powerpoint/2010/main" val="1060103933"/>
               </p:ext>
             </p:extLst>
           </p:nvPr>
@@ -4029,7 +4029,7 @@
                       <a:pPr algn="ctr"/>
                       <a:r>
                         <a:rPr lang="en-CA" sz="1100" dirty="0" smtClean="0"/>
-                        <a:t>0.85</a:t>
+                        <a:t>0.88</a:t>
                       </a:r>
                       <a:endParaRPr lang="en-CA" sz="1100" dirty="0"/>
                     </a:p>
@@ -4059,7 +4059,7 @@
                       <a:pPr algn="ctr"/>
                       <a:r>
                         <a:rPr lang="en-CA" sz="1100" dirty="0" smtClean="0"/>
-                        <a:t>0.85</a:t>
+                        <a:t>0.82</a:t>
                       </a:r>
                       <a:endParaRPr lang="en-CA" sz="1100" dirty="0"/>
                     </a:p>

</xml_diff>